<commit_message>
finishing touches on presentation
</commit_message>
<xml_diff>
--- a/presentation/ON-CALL.pptx
+++ b/presentation/ON-CALL.pptx
@@ -6881,32 +6881,45 @@
               </a:rPr>
               <a:t> </a:t>
             </a:r>
-            <a:r>
-              <a:rPr lang="he-IL" sz="3200" dirty="0">
+            <a:endParaRPr lang="he-IL" sz="3200" dirty="0" smtClean="0">
+              <a:latin typeface="Arial Unicode MS" panose="020B0604020202020204" pitchFamily="34" charset="-128"/>
+              <a:ea typeface="Arial Unicode MS" panose="020B0604020202020204" pitchFamily="34" charset="-128"/>
+              <a:cs typeface="Arial Unicode MS" panose="020B0604020202020204" pitchFamily="34" charset="-128"/>
+            </a:endParaRPr>
+          </a:p>
+          <a:p>
+            <a:pPr algn="r" rtl="1"/>
+            <a:r>
+              <a:rPr lang="en-US" sz="3200" dirty="0" smtClean="0">
                 <a:latin typeface="Arial Unicode MS" panose="020B0604020202020204" pitchFamily="34" charset="-128"/>
                 <a:ea typeface="Arial Unicode MS" panose="020B0604020202020204" pitchFamily="34" charset="-128"/>
                 <a:cs typeface="Arial Unicode MS" panose="020B0604020202020204" pitchFamily="34" charset="-128"/>
               </a:rPr>
-              <a:t>וקטלוג </a:t>
-            </a:r>
+              <a:t>NLP</a:t>
+            </a:r>
+            <a:endParaRPr lang="he-IL" sz="3200" dirty="0" smtClean="0">
+              <a:latin typeface="Arial Unicode MS" panose="020B0604020202020204" pitchFamily="34" charset="-128"/>
+              <a:ea typeface="Arial Unicode MS" panose="020B0604020202020204" pitchFamily="34" charset="-128"/>
+              <a:cs typeface="Arial Unicode MS" panose="020B0604020202020204" pitchFamily="34" charset="-128"/>
+            </a:endParaRPr>
+          </a:p>
+          <a:p>
+            <a:pPr algn="r" rtl="1"/>
             <a:r>
               <a:rPr lang="he-IL" sz="3200" dirty="0" smtClean="0">
                 <a:latin typeface="Arial Unicode MS" panose="020B0604020202020204" pitchFamily="34" charset="-128"/>
                 <a:ea typeface="Arial Unicode MS" panose="020B0604020202020204" pitchFamily="34" charset="-128"/>
                 <a:cs typeface="Arial Unicode MS" panose="020B0604020202020204" pitchFamily="34" charset="-128"/>
               </a:rPr>
-              <a:t>קריאות</a:t>
-            </a:r>
-          </a:p>
-          <a:p>
-            <a:pPr algn="r" rtl="1"/>
+              <a:t>התראות </a:t>
+            </a:r>
             <a:r>
               <a:rPr lang="he-IL" sz="3200" dirty="0" smtClean="0">
                 <a:latin typeface="Arial Unicode MS" panose="020B0604020202020204" pitchFamily="34" charset="-128"/>
                 <a:ea typeface="Arial Unicode MS" panose="020B0604020202020204" pitchFamily="34" charset="-128"/>
                 <a:cs typeface="Arial Unicode MS" panose="020B0604020202020204" pitchFamily="34" charset="-128"/>
               </a:rPr>
-              <a:t>התראות תז"מיות לסובבים</a:t>
+              <a:t>תז"מיות לסובבים</a:t>
             </a:r>
           </a:p>
           <a:p>
@@ -6991,14 +7004,14 @@
           <p:nvPr>
             <p:extLst>
               <p:ext uri="{D42A27DB-BD31-4B8C-83A1-F6EECF244321}">
-                <p14:modId xmlns:p14="http://schemas.microsoft.com/office/powerpoint/2010/main" val="1791805080"/>
+                <p14:modId xmlns:p14="http://schemas.microsoft.com/office/powerpoint/2010/main" val="2264772273"/>
               </p:ext>
             </p:extLst>
           </p:nvPr>
         </p:nvGraphicFramePr>
         <p:xfrm>
-          <a:off x="2839719" y="2057401"/>
-          <a:ext cx="8722362" cy="3672840"/>
+          <a:off x="685800" y="2194559"/>
+          <a:ext cx="10932162" cy="4158875"/>
         </p:xfrm>
         <a:graphic>
           <a:graphicData uri="http://schemas.openxmlformats.org/drawingml/2006/table">
@@ -7007,14 +7020,14 @@
                 <a:tableStyleId>{D7AC3CCA-C797-4891-BE02-D94E43425B78}</a:tableStyleId>
               </a:tblPr>
               <a:tblGrid>
-                <a:gridCol w="1453727"/>
-                <a:gridCol w="1453727"/>
-                <a:gridCol w="1453727"/>
-                <a:gridCol w="1416813"/>
-                <a:gridCol w="1490641"/>
-                <a:gridCol w="1453727"/>
+                <a:gridCol w="1822027"/>
+                <a:gridCol w="1822027"/>
+                <a:gridCol w="1822027"/>
+                <a:gridCol w="1775761"/>
+                <a:gridCol w="1868293"/>
+                <a:gridCol w="1822027"/>
               </a:tblGrid>
-              <a:tr h="370840">
+              <a:tr h="724783">
                 <a:tc>
                   <a:txBody>
                     <a:bodyPr/>
@@ -7170,7 +7183,7 @@
                   <a:tcPr/>
                 </a:tc>
               </a:tr>
-              <a:tr h="370840">
+              <a:tr h="419914">
                 <a:tc>
                   <a:txBody>
                     <a:bodyPr/>
@@ -7306,7 +7319,7 @@
                   <a:tcPr/>
                 </a:tc>
               </a:tr>
-              <a:tr h="370840">
+              <a:tr h="419914">
                 <a:tc>
                   <a:txBody>
                     <a:bodyPr/>
@@ -7438,7 +7451,7 @@
                   <a:tcPr/>
                 </a:tc>
               </a:tr>
-              <a:tr h="370840">
+              <a:tr h="724783">
                 <a:tc>
                   <a:txBody>
                     <a:bodyPr/>
@@ -7574,7 +7587,7 @@
                   <a:tcPr/>
                 </a:tc>
               </a:tr>
-              <a:tr h="370840">
+              <a:tr h="419914">
                 <a:tc>
                   <a:txBody>
                     <a:bodyPr/>
@@ -7706,7 +7719,7 @@
                   <a:tcPr/>
                 </a:tc>
               </a:tr>
-              <a:tr h="370840">
+              <a:tr h="1035405">
                 <a:tc>
                   <a:txBody>
                     <a:bodyPr/>
@@ -7858,7 +7871,7 @@
                   <a:tcPr/>
                 </a:tc>
               </a:tr>
-              <a:tr h="0">
+              <a:tr h="414162">
                 <a:tc>
                   <a:txBody>
                     <a:bodyPr/>
@@ -8152,6 +8165,30 @@
           <a:p>
             <a:pPr algn="r" rtl="1"/>
             <a:r>
+              <a:rPr lang="he-IL" sz="3200" dirty="0">
+                <a:latin typeface="Arial Unicode MS" panose="020B0604020202020204" pitchFamily="34" charset="-128"/>
+                <a:ea typeface="Arial Unicode MS" panose="020B0604020202020204" pitchFamily="34" charset="-128"/>
+                <a:cs typeface="Arial Unicode MS" panose="020B0604020202020204" pitchFamily="34" charset="-128"/>
+              </a:rPr>
+              <a:t>תדרוך תפעול במצב </a:t>
+            </a:r>
+            <a:r>
+              <a:rPr lang="he-IL" sz="3200" dirty="0" smtClean="0">
+                <a:latin typeface="Arial Unicode MS" panose="020B0604020202020204" pitchFamily="34" charset="-128"/>
+                <a:ea typeface="Arial Unicode MS" panose="020B0604020202020204" pitchFamily="34" charset="-128"/>
+                <a:cs typeface="Arial Unicode MS" panose="020B0604020202020204" pitchFamily="34" charset="-128"/>
+              </a:rPr>
+              <a:t>מצוקה</a:t>
+            </a:r>
+            <a:endParaRPr lang="he-IL" sz="3200" dirty="0" smtClean="0">
+              <a:latin typeface="Arial Unicode MS" panose="020B0604020202020204" pitchFamily="34" charset="-128"/>
+              <a:ea typeface="Arial Unicode MS" panose="020B0604020202020204" pitchFamily="34" charset="-128"/>
+              <a:cs typeface="Arial Unicode MS" panose="020B0604020202020204" pitchFamily="34" charset="-128"/>
+            </a:endParaRPr>
+          </a:p>
+          <a:p>
+            <a:pPr algn="r" rtl="1"/>
+            <a:r>
               <a:rPr lang="en-US" sz="3200" dirty="0" smtClean="0">
                 <a:latin typeface="Arial Unicode MS" panose="020B0604020202020204" pitchFamily="34" charset="-128"/>
                 <a:ea typeface="Arial Unicode MS" panose="020B0604020202020204" pitchFamily="34" charset="-128"/>
@@ -8176,18 +8213,15 @@
                 <a:ea typeface="Arial Unicode MS" panose="020B0604020202020204" pitchFamily="34" charset="-128"/>
                 <a:cs typeface="Arial Unicode MS" panose="020B0604020202020204" pitchFamily="34" charset="-128"/>
               </a:rPr>
-              <a:t>תדרוך תפעול במצב מצוקה</a:t>
-            </a:r>
-          </a:p>
-          <a:p>
-            <a:pPr algn="r" rtl="1"/>
+              <a:t>עמוד </a:t>
+            </a:r>
             <a:r>
               <a:rPr lang="he-IL" sz="3200" dirty="0" smtClean="0">
                 <a:latin typeface="Arial Unicode MS" panose="020B0604020202020204" pitchFamily="34" charset="-128"/>
                 <a:ea typeface="Arial Unicode MS" panose="020B0604020202020204" pitchFamily="34" charset="-128"/>
                 <a:cs typeface="Arial Unicode MS" panose="020B0604020202020204" pitchFamily="34" charset="-128"/>
               </a:rPr>
-              <a:t>עמוד אירוע מפורט עם </a:t>
+              <a:t>אירוע מפורט עם </a:t>
             </a:r>
             <a:r>
               <a:rPr lang="en-US" sz="3200" dirty="0" smtClean="0">

</xml_diff>